<commit_message>
Update A Functional Language for Parallel Computing.pptx
</commit_message>
<xml_diff>
--- a/A Functional Language for Parallel Computing.pptx
+++ b/A Functional Language for Parallel Computing.pptx
@@ -9,13 +9,13 @@
     <p:sldId id="257" r:id="rId3"/>
     <p:sldId id="259" r:id="rId4"/>
     <p:sldId id="262" r:id="rId5"/>
-    <p:sldId id="285" r:id="rId6"/>
-    <p:sldId id="276" r:id="rId7"/>
-    <p:sldId id="284" r:id="rId8"/>
-    <p:sldId id="277" r:id="rId9"/>
-    <p:sldId id="282" r:id="rId10"/>
-    <p:sldId id="278" r:id="rId11"/>
-    <p:sldId id="281" r:id="rId12"/>
+    <p:sldId id="276" r:id="rId6"/>
+    <p:sldId id="284" r:id="rId7"/>
+    <p:sldId id="277" r:id="rId8"/>
+    <p:sldId id="282" r:id="rId9"/>
+    <p:sldId id="278" r:id="rId10"/>
+    <p:sldId id="281" r:id="rId11"/>
+    <p:sldId id="285" r:id="rId12"/>
     <p:sldId id="260" r:id="rId13"/>
     <p:sldId id="261" r:id="rId14"/>
     <p:sldId id="279" r:id="rId15"/>
@@ -137,6 +137,11 @@
       </a:defRPr>
     </a:lvl9pPr>
   </p:defaultTextStyle>
+  <p:extLst>
+    <p:ext uri="{EFAFB233-063F-42B5-8137-9DF3F51BA10A}">
+      <p15:sldGuideLst xmlns:p15="http://schemas.microsoft.com/office/powerpoint/2012/main"/>
+    </p:ext>
+  </p:extLst>
 </p:presentation>
 </file>
 
@@ -289,7 +294,7 @@
           <a:p>
             <a:fld id="{14E28C98-E9DF-4981-9C7E-7EEDDCF58FD4}" type="datetimeFigureOut">
               <a:rPr lang="zh-CN" altLang="en-US" smtClean="0"/>
-              <a:t>2023/3/15</a:t>
+              <a:t>2023/3/16</a:t>
             </a:fld>
             <a:endParaRPr lang="zh-CN" altLang="en-US"/>
           </a:p>
@@ -489,7 +494,7 @@
           <a:p>
             <a:fld id="{14E28C98-E9DF-4981-9C7E-7EEDDCF58FD4}" type="datetimeFigureOut">
               <a:rPr lang="zh-CN" altLang="en-US" smtClean="0"/>
-              <a:t>2023/3/15</a:t>
+              <a:t>2023/3/16</a:t>
             </a:fld>
             <a:endParaRPr lang="zh-CN" altLang="en-US"/>
           </a:p>
@@ -699,7 +704,7 @@
           <a:p>
             <a:fld id="{14E28C98-E9DF-4981-9C7E-7EEDDCF58FD4}" type="datetimeFigureOut">
               <a:rPr lang="zh-CN" altLang="en-US" smtClean="0"/>
-              <a:t>2023/3/15</a:t>
+              <a:t>2023/3/16</a:t>
             </a:fld>
             <a:endParaRPr lang="zh-CN" altLang="en-US"/>
           </a:p>
@@ -899,7 +904,7 @@
           <a:p>
             <a:fld id="{14E28C98-E9DF-4981-9C7E-7EEDDCF58FD4}" type="datetimeFigureOut">
               <a:rPr lang="zh-CN" altLang="en-US" smtClean="0"/>
-              <a:t>2023/3/15</a:t>
+              <a:t>2023/3/16</a:t>
             </a:fld>
             <a:endParaRPr lang="zh-CN" altLang="en-US"/>
           </a:p>
@@ -1175,7 +1180,7 @@
           <a:p>
             <a:fld id="{14E28C98-E9DF-4981-9C7E-7EEDDCF58FD4}" type="datetimeFigureOut">
               <a:rPr lang="zh-CN" altLang="en-US" smtClean="0"/>
-              <a:t>2023/3/15</a:t>
+              <a:t>2023/3/16</a:t>
             </a:fld>
             <a:endParaRPr lang="zh-CN" altLang="en-US"/>
           </a:p>
@@ -1443,7 +1448,7 @@
           <a:p>
             <a:fld id="{14E28C98-E9DF-4981-9C7E-7EEDDCF58FD4}" type="datetimeFigureOut">
               <a:rPr lang="zh-CN" altLang="en-US" smtClean="0"/>
-              <a:t>2023/3/15</a:t>
+              <a:t>2023/3/16</a:t>
             </a:fld>
             <a:endParaRPr lang="zh-CN" altLang="en-US"/>
           </a:p>
@@ -1858,7 +1863,7 @@
           <a:p>
             <a:fld id="{14E28C98-E9DF-4981-9C7E-7EEDDCF58FD4}" type="datetimeFigureOut">
               <a:rPr lang="zh-CN" altLang="en-US" smtClean="0"/>
-              <a:t>2023/3/15</a:t>
+              <a:t>2023/3/16</a:t>
             </a:fld>
             <a:endParaRPr lang="zh-CN" altLang="en-US"/>
           </a:p>
@@ -2000,7 +2005,7 @@
           <a:p>
             <a:fld id="{14E28C98-E9DF-4981-9C7E-7EEDDCF58FD4}" type="datetimeFigureOut">
               <a:rPr lang="zh-CN" altLang="en-US" smtClean="0"/>
-              <a:t>2023/3/15</a:t>
+              <a:t>2023/3/16</a:t>
             </a:fld>
             <a:endParaRPr lang="zh-CN" altLang="en-US"/>
           </a:p>
@@ -2113,7 +2118,7 @@
           <a:p>
             <a:fld id="{14E28C98-E9DF-4981-9C7E-7EEDDCF58FD4}" type="datetimeFigureOut">
               <a:rPr lang="zh-CN" altLang="en-US" smtClean="0"/>
-              <a:t>2023/3/15</a:t>
+              <a:t>2023/3/16</a:t>
             </a:fld>
             <a:endParaRPr lang="zh-CN" altLang="en-US"/>
           </a:p>
@@ -2426,7 +2431,7 @@
           <a:p>
             <a:fld id="{14E28C98-E9DF-4981-9C7E-7EEDDCF58FD4}" type="datetimeFigureOut">
               <a:rPr lang="zh-CN" altLang="en-US" smtClean="0"/>
-              <a:t>2023/3/15</a:t>
+              <a:t>2023/3/16</a:t>
             </a:fld>
             <a:endParaRPr lang="zh-CN" altLang="en-US"/>
           </a:p>
@@ -2715,7 +2720,7 @@
           <a:p>
             <a:fld id="{14E28C98-E9DF-4981-9C7E-7EEDDCF58FD4}" type="datetimeFigureOut">
               <a:rPr lang="zh-CN" altLang="en-US" smtClean="0"/>
-              <a:t>2023/3/15</a:t>
+              <a:t>2023/3/16</a:t>
             </a:fld>
             <a:endParaRPr lang="zh-CN" altLang="en-US"/>
           </a:p>
@@ -2958,7 +2963,7 @@
           <a:p>
             <a:fld id="{14E28C98-E9DF-4981-9C7E-7EEDDCF58FD4}" type="datetimeFigureOut">
               <a:rPr lang="zh-CN" altLang="en-US" smtClean="0"/>
-              <a:t>2023/3/15</a:t>
+              <a:t>2023/3/16</a:t>
             </a:fld>
             <a:endParaRPr lang="zh-CN" altLang="en-US"/>
           </a:p>
@@ -3533,7 +3538,7 @@
           <a:p>
             <a:r>
               <a:rPr lang="en-US" altLang="zh-CN" dirty="0"/>
-              <a:t>Examples</a:t>
+              <a:t>Examples (reduce in block)</a:t>
             </a:r>
             <a:endParaRPr lang="zh-CN" altLang="en-US" dirty="0"/>
           </a:p>
@@ -3586,8 +3591,8 @@
         </p:blipFill>
         <p:spPr>
           <a:xfrm>
-            <a:off x="838200" y="1825625"/>
-            <a:ext cx="5980445" cy="1530428"/>
+            <a:off x="0" y="2603458"/>
+            <a:ext cx="3225966" cy="825542"/>
           </a:xfrm>
           <a:prstGeom prst="rect">
             <a:avLst/>
@@ -3616,8 +3621,38 @@
         </p:blipFill>
         <p:spPr>
           <a:xfrm>
-            <a:off x="838200" y="3934580"/>
-            <a:ext cx="5800078" cy="2435225"/>
+            <a:off x="0" y="4453131"/>
+            <a:ext cx="3645087" cy="1530429"/>
+          </a:xfrm>
+          <a:prstGeom prst="rect">
+            <a:avLst/>
+          </a:prstGeom>
+        </p:spPr>
+      </p:pic>
+      <p:pic>
+        <p:nvPicPr>
+          <p:cNvPr id="8" name="Picture 7">
+            <a:extLst>
+              <a:ext uri="{FF2B5EF4-FFF2-40B4-BE49-F238E27FC236}">
+                <a16:creationId xmlns:a16="http://schemas.microsoft.com/office/drawing/2014/main" id="{C300DF5D-283C-2965-0027-63707E2B2CF2}"/>
+              </a:ext>
+            </a:extLst>
+          </p:cNvPr>
+          <p:cNvPicPr>
+            <a:picLocks noChangeAspect="1"/>
+          </p:cNvPicPr>
+          <p:nvPr/>
+        </p:nvPicPr>
+        <p:blipFill>
+          <a:blip r:embed="rId4"/>
+          <a:stretch>
+            <a:fillRect/>
+          </a:stretch>
+        </p:blipFill>
+        <p:spPr>
+          <a:xfrm>
+            <a:off x="3460301" y="1369083"/>
+            <a:ext cx="8731699" cy="5264421"/>
           </a:xfrm>
           <a:prstGeom prst="rect">
             <a:avLst/>
@@ -3627,7 +3662,7 @@
     </p:spTree>
     <p:extLst>
       <p:ext uri="{BB962C8B-B14F-4D97-AF65-F5344CB8AC3E}">
-        <p14:creationId xmlns:p14="http://schemas.microsoft.com/office/powerpoint/2010/main" val="1431643269"/>
+        <p14:creationId xmlns:p14="http://schemas.microsoft.com/office/powerpoint/2010/main" val="1871562805"/>
       </p:ext>
     </p:extLst>
   </p:cSld>
@@ -3659,7 +3694,7 @@
           <p:cNvPr id="2" name="Title 1">
             <a:extLst>
               <a:ext uri="{FF2B5EF4-FFF2-40B4-BE49-F238E27FC236}">
-                <a16:creationId xmlns:a16="http://schemas.microsoft.com/office/drawing/2014/main" id="{76EA041E-D6C6-2625-CC45-FDE60D80B41A}"/>
+                <a16:creationId xmlns:a16="http://schemas.microsoft.com/office/drawing/2014/main" id="{2078E4EA-2DBF-1582-BA91-E41A44308C07}"/>
               </a:ext>
             </a:extLst>
           </p:cNvPr>
@@ -3677,7 +3712,7 @@
           <a:p>
             <a:r>
               <a:rPr lang="en-US" altLang="zh-CN" dirty="0"/>
-              <a:t>Examples</a:t>
+              <a:t>Feature Summary</a:t>
             </a:r>
             <a:endParaRPr lang="zh-CN" altLang="en-US" dirty="0"/>
           </a:p>
@@ -3688,7 +3723,7 @@
           <p:cNvPr id="3" name="Content Placeholder 2">
             <a:extLst>
               <a:ext uri="{FF2B5EF4-FFF2-40B4-BE49-F238E27FC236}">
-                <a16:creationId xmlns:a16="http://schemas.microsoft.com/office/drawing/2014/main" id="{630A0D16-E875-341F-2DAC-8FF3CE64420C}"/>
+                <a16:creationId xmlns:a16="http://schemas.microsoft.com/office/drawing/2014/main" id="{2A591864-529A-C8B5-6DD5-A91378D2A3A2}"/>
               </a:ext>
             </a:extLst>
           </p:cNvPr>
@@ -3699,109 +3734,348 @@
             <p:ph idx="1"/>
           </p:nvPr>
         </p:nvSpPr>
-        <p:spPr/>
-        <p:txBody>
-          <a:bodyPr/>
-          <a:lstStyle/>
-          <a:p>
-            <a:endParaRPr lang="zh-CN" altLang="en-US"/>
-          </a:p>
-        </p:txBody>
-      </p:sp>
-      <p:pic>
-        <p:nvPicPr>
-          <p:cNvPr id="5" name="Picture 4">
-            <a:extLst>
-              <a:ext uri="{FF2B5EF4-FFF2-40B4-BE49-F238E27FC236}">
-                <a16:creationId xmlns:a16="http://schemas.microsoft.com/office/drawing/2014/main" id="{785E48CA-77AB-9444-3847-FDF9F0E27D30}"/>
-              </a:ext>
-            </a:extLst>
-          </p:cNvPr>
-          <p:cNvPicPr>
-            <a:picLocks noChangeAspect="1"/>
-          </p:cNvPicPr>
-          <p:nvPr/>
-        </p:nvPicPr>
-        <p:blipFill>
-          <a:blip r:embed="rId2"/>
-          <a:stretch>
-            <a:fillRect/>
-          </a:stretch>
-        </p:blipFill>
         <p:spPr>
           <a:xfrm>
-            <a:off x="0" y="2603458"/>
-            <a:ext cx="3225966" cy="825542"/>
+            <a:off x="352425" y="1825625"/>
+            <a:ext cx="6067425" cy="4351338"/>
+          </a:xfrm>
+        </p:spPr>
+        <p:txBody>
+          <a:bodyPr>
+            <a:normAutofit fontScale="92500" lnSpcReduction="20000"/>
+          </a:bodyPr>
+          <a:lstStyle/>
+          <a:p>
+            <a:r>
+              <a:rPr lang="en-US" altLang="zh-CN" dirty="0"/>
+              <a:t>Primitive types: float, int, bool</a:t>
+            </a:r>
+          </a:p>
+          <a:p>
+            <a:pPr lvl="1"/>
+            <a:r>
+              <a:rPr lang="en-US" altLang="zh-CN" dirty="0"/>
+              <a:t>Can also be cast implicit from corresponding Scala type</a:t>
+            </a:r>
+          </a:p>
+          <a:p>
+            <a:r>
+              <a:rPr lang="en-US" altLang="zh-CN" dirty="0"/>
+              <a:t>Array type: 1D float array</a:t>
+            </a:r>
+          </a:p>
+          <a:p>
+            <a:r>
+              <a:rPr lang="en-US" altLang="zh-CN" dirty="0"/>
+              <a:t>Expression type: float, int, bool, and array</a:t>
+            </a:r>
+          </a:p>
+          <a:p>
+            <a:r>
+              <a:rPr lang="en-US" altLang="zh-CN" dirty="0"/>
+              <a:t>Operators</a:t>
+            </a:r>
+          </a:p>
+          <a:p>
+            <a:pPr lvl="1"/>
+            <a:r>
+              <a:rPr lang="en-US" altLang="zh-CN" dirty="0"/>
+              <a:t>Arithmetic: +, -, *, /, %, unary +, unary –</a:t>
+            </a:r>
+          </a:p>
+          <a:p>
+            <a:pPr lvl="1"/>
+            <a:r>
+              <a:rPr lang="en-US" altLang="zh-CN" dirty="0"/>
+              <a:t>Logical: ==, !=, &lt;, &lt;=, &gt;, &gt;=, &amp;&amp;, ||, !</a:t>
+            </a:r>
+          </a:p>
+          <a:p>
+            <a:r>
+              <a:rPr lang="en-US" altLang="zh-CN" dirty="0"/>
+              <a:t>Programming paradigms</a:t>
+            </a:r>
+          </a:p>
+          <a:p>
+            <a:pPr lvl="1"/>
+            <a:r>
+              <a:rPr lang="en-US" altLang="zh-CN" dirty="0"/>
+              <a:t>Functional programming</a:t>
+            </a:r>
+          </a:p>
+          <a:p>
+            <a:pPr lvl="2"/>
+            <a:r>
+              <a:rPr lang="en-US" altLang="zh-CN" dirty="0"/>
+              <a:t>map, zip with, reduce in block</a:t>
+            </a:r>
+          </a:p>
+          <a:p>
+            <a:pPr lvl="1"/>
+            <a:r>
+              <a:rPr lang="en-US" altLang="zh-CN" dirty="0"/>
+              <a:t>Array programming</a:t>
+            </a:r>
+          </a:p>
+          <a:p>
+            <a:pPr lvl="1"/>
+            <a:endParaRPr lang="en-US" altLang="zh-CN" dirty="0"/>
+          </a:p>
+        </p:txBody>
+      </p:sp>
+      <p:sp>
+        <p:nvSpPr>
+          <p:cNvPr id="4" name="Content Placeholder 2">
+            <a:extLst>
+              <a:ext uri="{FF2B5EF4-FFF2-40B4-BE49-F238E27FC236}">
+                <a16:creationId xmlns:a16="http://schemas.microsoft.com/office/drawing/2014/main" id="{D0E65256-C32F-34FA-9D76-1F9B9F243727}"/>
+              </a:ext>
+            </a:extLst>
+          </p:cNvPr>
+          <p:cNvSpPr txBox="1">
+            <a:spLocks/>
+          </p:cNvSpPr>
+          <p:nvPr/>
+        </p:nvSpPr>
+        <p:spPr>
+          <a:xfrm>
+            <a:off x="6200775" y="1825625"/>
+            <a:ext cx="6067425" cy="4351338"/>
           </a:xfrm>
           <a:prstGeom prst="rect">
             <a:avLst/>
           </a:prstGeom>
         </p:spPr>
-      </p:pic>
-      <p:pic>
-        <p:nvPicPr>
-          <p:cNvPr id="7" name="Picture 6">
-            <a:extLst>
-              <a:ext uri="{FF2B5EF4-FFF2-40B4-BE49-F238E27FC236}">
-                <a16:creationId xmlns:a16="http://schemas.microsoft.com/office/drawing/2014/main" id="{4A27198B-0A7B-9E52-96C9-255E1D047683}"/>
-              </a:ext>
-            </a:extLst>
-          </p:cNvPr>
-          <p:cNvPicPr>
-            <a:picLocks noChangeAspect="1"/>
-          </p:cNvPicPr>
-          <p:nvPr/>
-        </p:nvPicPr>
-        <p:blipFill>
-          <a:blip r:embed="rId3"/>
-          <a:stretch>
-            <a:fillRect/>
-          </a:stretch>
-        </p:blipFill>
-        <p:spPr>
-          <a:xfrm>
-            <a:off x="0" y="4453131"/>
-            <a:ext cx="3645087" cy="1530429"/>
-          </a:xfrm>
-          <a:prstGeom prst="rect">
-            <a:avLst/>
-          </a:prstGeom>
-        </p:spPr>
-      </p:pic>
-      <p:pic>
-        <p:nvPicPr>
-          <p:cNvPr id="6" name="Picture 5">
-            <a:extLst>
-              <a:ext uri="{FF2B5EF4-FFF2-40B4-BE49-F238E27FC236}">
-                <a16:creationId xmlns:a16="http://schemas.microsoft.com/office/drawing/2014/main" id="{B61499D5-382B-CC04-F819-2D223E18A77B}"/>
-              </a:ext>
-            </a:extLst>
-          </p:cNvPr>
-          <p:cNvPicPr>
-            <a:picLocks noChangeAspect="1"/>
-          </p:cNvPicPr>
-          <p:nvPr/>
-        </p:nvPicPr>
-        <p:blipFill>
-          <a:blip r:embed="rId4"/>
-          <a:stretch>
-            <a:fillRect/>
-          </a:stretch>
-        </p:blipFill>
-        <p:spPr>
-          <a:xfrm>
-            <a:off x="3555556" y="874440"/>
-            <a:ext cx="8636444" cy="5302523"/>
-          </a:xfrm>
-          <a:prstGeom prst="rect">
-            <a:avLst/>
-          </a:prstGeom>
-        </p:spPr>
-      </p:pic>
+        <p:txBody>
+          <a:bodyPr vert="horz" lIns="91440" tIns="45720" rIns="91440" bIns="45720" rtlCol="0">
+            <a:normAutofit/>
+          </a:bodyPr>
+          <a:lstStyle>
+            <a:lvl1pPr marL="228600" indent="-228600" algn="l" defTabSz="914400" rtl="0" eaLnBrk="1" latinLnBrk="0" hangingPunct="1">
+              <a:lnSpc>
+                <a:spcPct val="90000"/>
+              </a:lnSpc>
+              <a:spcBef>
+                <a:spcPts val="1000"/>
+              </a:spcBef>
+              <a:buFont typeface="Arial" panose="020B0604020202020204" pitchFamily="34" charset="0"/>
+              <a:buChar char="•"/>
+              <a:defRPr sz="2800" kern="1200">
+                <a:solidFill>
+                  <a:schemeClr val="tx1"/>
+                </a:solidFill>
+                <a:latin typeface="+mn-lt"/>
+                <a:ea typeface="+mn-ea"/>
+                <a:cs typeface="+mn-cs"/>
+              </a:defRPr>
+            </a:lvl1pPr>
+            <a:lvl2pPr marL="685800" indent="-228600" algn="l" defTabSz="914400" rtl="0" eaLnBrk="1" latinLnBrk="0" hangingPunct="1">
+              <a:lnSpc>
+                <a:spcPct val="90000"/>
+              </a:lnSpc>
+              <a:spcBef>
+                <a:spcPts val="500"/>
+              </a:spcBef>
+              <a:buFont typeface="Arial" panose="020B0604020202020204" pitchFamily="34" charset="0"/>
+              <a:buChar char="•"/>
+              <a:defRPr sz="2400" kern="1200">
+                <a:solidFill>
+                  <a:schemeClr val="tx1"/>
+                </a:solidFill>
+                <a:latin typeface="+mn-lt"/>
+                <a:ea typeface="+mn-ea"/>
+                <a:cs typeface="+mn-cs"/>
+              </a:defRPr>
+            </a:lvl2pPr>
+            <a:lvl3pPr marL="1143000" indent="-228600" algn="l" defTabSz="914400" rtl="0" eaLnBrk="1" latinLnBrk="0" hangingPunct="1">
+              <a:lnSpc>
+                <a:spcPct val="90000"/>
+              </a:lnSpc>
+              <a:spcBef>
+                <a:spcPts val="500"/>
+              </a:spcBef>
+              <a:buFont typeface="Arial" panose="020B0604020202020204" pitchFamily="34" charset="0"/>
+              <a:buChar char="•"/>
+              <a:defRPr sz="2000" kern="1200">
+                <a:solidFill>
+                  <a:schemeClr val="tx1"/>
+                </a:solidFill>
+                <a:latin typeface="+mn-lt"/>
+                <a:ea typeface="+mn-ea"/>
+                <a:cs typeface="+mn-cs"/>
+              </a:defRPr>
+            </a:lvl3pPr>
+            <a:lvl4pPr marL="1600200" indent="-228600" algn="l" defTabSz="914400" rtl="0" eaLnBrk="1" latinLnBrk="0" hangingPunct="1">
+              <a:lnSpc>
+                <a:spcPct val="90000"/>
+              </a:lnSpc>
+              <a:spcBef>
+                <a:spcPts val="500"/>
+              </a:spcBef>
+              <a:buFont typeface="Arial" panose="020B0604020202020204" pitchFamily="34" charset="0"/>
+              <a:buChar char="•"/>
+              <a:defRPr sz="1800" kern="1200">
+                <a:solidFill>
+                  <a:schemeClr val="tx1"/>
+                </a:solidFill>
+                <a:latin typeface="+mn-lt"/>
+                <a:ea typeface="+mn-ea"/>
+                <a:cs typeface="+mn-cs"/>
+              </a:defRPr>
+            </a:lvl4pPr>
+            <a:lvl5pPr marL="2057400" indent="-228600" algn="l" defTabSz="914400" rtl="0" eaLnBrk="1" latinLnBrk="0" hangingPunct="1">
+              <a:lnSpc>
+                <a:spcPct val="90000"/>
+              </a:lnSpc>
+              <a:spcBef>
+                <a:spcPts val="500"/>
+              </a:spcBef>
+              <a:buFont typeface="Arial" panose="020B0604020202020204" pitchFamily="34" charset="0"/>
+              <a:buChar char="•"/>
+              <a:defRPr sz="1800" kern="1200">
+                <a:solidFill>
+                  <a:schemeClr val="tx1"/>
+                </a:solidFill>
+                <a:latin typeface="+mn-lt"/>
+                <a:ea typeface="+mn-ea"/>
+                <a:cs typeface="+mn-cs"/>
+              </a:defRPr>
+            </a:lvl5pPr>
+            <a:lvl6pPr marL="2514600" indent="-228600" algn="l" defTabSz="914400" rtl="0" eaLnBrk="1" latinLnBrk="0" hangingPunct="1">
+              <a:lnSpc>
+                <a:spcPct val="90000"/>
+              </a:lnSpc>
+              <a:spcBef>
+                <a:spcPts val="500"/>
+              </a:spcBef>
+              <a:buFont typeface="Arial" panose="020B0604020202020204" pitchFamily="34" charset="0"/>
+              <a:buChar char="•"/>
+              <a:defRPr sz="1800" kern="1200">
+                <a:solidFill>
+                  <a:schemeClr val="tx1"/>
+                </a:solidFill>
+                <a:latin typeface="+mn-lt"/>
+                <a:ea typeface="+mn-ea"/>
+                <a:cs typeface="+mn-cs"/>
+              </a:defRPr>
+            </a:lvl6pPr>
+            <a:lvl7pPr marL="2971800" indent="-228600" algn="l" defTabSz="914400" rtl="0" eaLnBrk="1" latinLnBrk="0" hangingPunct="1">
+              <a:lnSpc>
+                <a:spcPct val="90000"/>
+              </a:lnSpc>
+              <a:spcBef>
+                <a:spcPts val="500"/>
+              </a:spcBef>
+              <a:buFont typeface="Arial" panose="020B0604020202020204" pitchFamily="34" charset="0"/>
+              <a:buChar char="•"/>
+              <a:defRPr sz="1800" kern="1200">
+                <a:solidFill>
+                  <a:schemeClr val="tx1"/>
+                </a:solidFill>
+                <a:latin typeface="+mn-lt"/>
+                <a:ea typeface="+mn-ea"/>
+                <a:cs typeface="+mn-cs"/>
+              </a:defRPr>
+            </a:lvl7pPr>
+            <a:lvl8pPr marL="3429000" indent="-228600" algn="l" defTabSz="914400" rtl="0" eaLnBrk="1" latinLnBrk="0" hangingPunct="1">
+              <a:lnSpc>
+                <a:spcPct val="90000"/>
+              </a:lnSpc>
+              <a:spcBef>
+                <a:spcPts val="500"/>
+              </a:spcBef>
+              <a:buFont typeface="Arial" panose="020B0604020202020204" pitchFamily="34" charset="0"/>
+              <a:buChar char="•"/>
+              <a:defRPr sz="1800" kern="1200">
+                <a:solidFill>
+                  <a:schemeClr val="tx1"/>
+                </a:solidFill>
+                <a:latin typeface="+mn-lt"/>
+                <a:ea typeface="+mn-ea"/>
+                <a:cs typeface="+mn-cs"/>
+              </a:defRPr>
+            </a:lvl8pPr>
+            <a:lvl9pPr marL="3886200" indent="-228600" algn="l" defTabSz="914400" rtl="0" eaLnBrk="1" latinLnBrk="0" hangingPunct="1">
+              <a:lnSpc>
+                <a:spcPct val="90000"/>
+              </a:lnSpc>
+              <a:spcBef>
+                <a:spcPts val="500"/>
+              </a:spcBef>
+              <a:buFont typeface="Arial" panose="020B0604020202020204" pitchFamily="34" charset="0"/>
+              <a:buChar char="•"/>
+              <a:defRPr sz="1800" kern="1200">
+                <a:solidFill>
+                  <a:schemeClr val="tx1"/>
+                </a:solidFill>
+                <a:latin typeface="+mn-lt"/>
+                <a:ea typeface="+mn-ea"/>
+                <a:cs typeface="+mn-cs"/>
+              </a:defRPr>
+            </a:lvl9pPr>
+          </a:lstStyle>
+          <a:p>
+            <a:r>
+              <a:rPr lang="en-US" altLang="zh-CN" dirty="0"/>
+              <a:t>Type system</a:t>
+            </a:r>
+          </a:p>
+          <a:p>
+            <a:pPr lvl="1"/>
+            <a:r>
+              <a:rPr lang="en-US" altLang="zh-CN" dirty="0"/>
+              <a:t>Strict type check at Scala compilation time</a:t>
+            </a:r>
+          </a:p>
+          <a:p>
+            <a:pPr lvl="1"/>
+            <a:r>
+              <a:rPr lang="en-US" altLang="zh-CN" dirty="0"/>
+              <a:t>Automatic type inference for return value</a:t>
+            </a:r>
+          </a:p>
+          <a:p>
+            <a:pPr lvl="1"/>
+            <a:r>
+              <a:rPr lang="en-US" altLang="zh-CN" dirty="0"/>
+              <a:t>Type safety for compiler development</a:t>
+            </a:r>
+          </a:p>
+          <a:p>
+            <a:r>
+              <a:rPr lang="en-US" altLang="zh-CN" dirty="0"/>
+              <a:t>Memory safety</a:t>
+            </a:r>
+          </a:p>
+          <a:p>
+            <a:pPr lvl="1"/>
+            <a:r>
+              <a:rPr lang="en-US" altLang="zh-CN" dirty="0"/>
+              <a:t>Bound check</a:t>
+            </a:r>
+          </a:p>
+          <a:p>
+            <a:r>
+              <a:rPr lang="en-US" altLang="zh-CN" dirty="0"/>
+              <a:t>Shared memory support</a:t>
+            </a:r>
+          </a:p>
+          <a:p>
+            <a:r>
+              <a:rPr lang="en-US" altLang="zh-CN" dirty="0"/>
+              <a:t>Support for indices</a:t>
+            </a:r>
+          </a:p>
+          <a:p>
+            <a:pPr lvl="1"/>
+            <a:endParaRPr lang="en-US" altLang="zh-CN" dirty="0"/>
+          </a:p>
+        </p:txBody>
+      </p:sp>
     </p:spTree>
     <p:extLst>
       <p:ext uri="{BB962C8B-B14F-4D97-AF65-F5344CB8AC3E}">
-        <p14:creationId xmlns:p14="http://schemas.microsoft.com/office/powerpoint/2010/main" val="1871562805"/>
+        <p14:creationId xmlns:p14="http://schemas.microsoft.com/office/powerpoint/2010/main" val="1810162794"/>
       </p:ext>
     </p:extLst>
   </p:cSld>
@@ -4058,10 +4332,10 @@
       </p:sp>
       <p:pic>
         <p:nvPicPr>
-          <p:cNvPr id="5" name="Picture 4">
-            <a:extLst>
-              <a:ext uri="{FF2B5EF4-FFF2-40B4-BE49-F238E27FC236}">
-                <a16:creationId xmlns:a16="http://schemas.microsoft.com/office/drawing/2014/main" id="{470CF9A1-9E74-3B1F-EFF2-A58128A10229}"/>
+          <p:cNvPr id="6" name="Picture 5">
+            <a:extLst>
+              <a:ext uri="{FF2B5EF4-FFF2-40B4-BE49-F238E27FC236}">
+                <a16:creationId xmlns:a16="http://schemas.microsoft.com/office/drawing/2014/main" id="{82E6417E-7D0B-9739-0ED5-968FDBDC2B34}"/>
               </a:ext>
             </a:extLst>
           </p:cNvPr>
@@ -4078,8 +4352,8 @@
         </p:blipFill>
         <p:spPr>
           <a:xfrm>
-            <a:off x="914258" y="2482763"/>
-            <a:ext cx="5505733" cy="3359323"/>
+            <a:off x="1121286" y="2499800"/>
+            <a:ext cx="6112634" cy="4270801"/>
           </a:xfrm>
           <a:prstGeom prst="rect">
             <a:avLst/>
@@ -4183,10 +4457,10 @@
       </p:sp>
       <p:pic>
         <p:nvPicPr>
-          <p:cNvPr id="5" name="Picture 4">
-            <a:extLst>
-              <a:ext uri="{FF2B5EF4-FFF2-40B4-BE49-F238E27FC236}">
-                <a16:creationId xmlns:a16="http://schemas.microsoft.com/office/drawing/2014/main" id="{470CF9A1-9E74-3B1F-EFF2-A58128A10229}"/>
+          <p:cNvPr id="4" name="Picture 3">
+            <a:extLst>
+              <a:ext uri="{FF2B5EF4-FFF2-40B4-BE49-F238E27FC236}">
+                <a16:creationId xmlns:a16="http://schemas.microsoft.com/office/drawing/2014/main" id="{A2665E92-ACE2-B5A0-B5D9-D2DAF224DBB3}"/>
               </a:ext>
             </a:extLst>
           </p:cNvPr>
@@ -4203,8 +4477,8 @@
         </p:blipFill>
         <p:spPr>
           <a:xfrm>
-            <a:off x="914258" y="2482763"/>
-            <a:ext cx="5505733" cy="3359323"/>
+            <a:off x="0" y="2499800"/>
+            <a:ext cx="6112634" cy="4270801"/>
           </a:xfrm>
           <a:prstGeom prst="rect">
             <a:avLst/>
@@ -4233,7 +4507,7 @@
         </p:blipFill>
         <p:spPr>
           <a:xfrm>
-            <a:off x="2255370" y="2279015"/>
+            <a:off x="2346810" y="2279015"/>
             <a:ext cx="9845190" cy="4578985"/>
           </a:xfrm>
           <a:prstGeom prst="rect">
@@ -6988,6 +7262,12 @@
             <a:r>
               <a:rPr lang="en-US" altLang="zh-CN" dirty="0"/>
               <a:t>Delay generating text as possible</a:t>
+            </a:r>
+          </a:p>
+          <a:p>
+            <a:r>
+              <a:rPr lang="en-US" altLang="zh-CN" dirty="0"/>
+              <a:t>Easy to extend the DSL</a:t>
             </a:r>
           </a:p>
           <a:p>
@@ -7954,7 +8234,7 @@
             <a:pPr lvl="1"/>
             <a:r>
               <a:rPr lang="en-US" altLang="zh-CN" dirty="0"/>
-              <a:t>Can be removed by the CUDA compiler</a:t>
+              <a:t>Can partly be removed by the CUDA compiler</a:t>
             </a:r>
             <a:endParaRPr lang="zh-CN" altLang="en-US" dirty="0"/>
           </a:p>
@@ -8163,7 +8443,9 @@
           </a:xfrm>
         </p:spPr>
         <p:txBody>
-          <a:bodyPr/>
+          <a:bodyPr>
+            <a:normAutofit/>
+          </a:bodyPr>
           <a:lstStyle/>
           <a:p>
             <a:r>
@@ -8181,6 +8463,13 @@
             <a:r>
               <a:rPr lang="en-US" altLang="zh-CN" dirty="0"/>
               <a:t>Keep APIs functional and easy-to-use</a:t>
+            </a:r>
+          </a:p>
+          <a:p>
+            <a:pPr lvl="1"/>
+            <a:r>
+              <a:rPr lang="en-US" altLang="zh-CN" dirty="0"/>
+              <a:t>If possible, don’t add new constructs</a:t>
             </a:r>
           </a:p>
           <a:p>
@@ -10170,7 +10459,14 @@
             <a:pPr lvl="1"/>
             <a:r>
               <a:rPr lang="en-US" altLang="zh-CN" dirty="0"/>
-              <a:t>Collections are good</a:t>
+              <a:t>Concise</a:t>
+            </a:r>
+          </a:p>
+          <a:p>
+            <a:pPr lvl="1"/>
+            <a:r>
+              <a:rPr lang="en-US" altLang="zh-CN" dirty="0"/>
+              <a:t>Scala collections are helpful and easy-to-use</a:t>
             </a:r>
           </a:p>
           <a:p>
@@ -10197,8 +10493,11 @@
             <a:pPr lvl="1"/>
             <a:r>
               <a:rPr lang="en-US" altLang="zh-CN" dirty="0"/>
-              <a:t>Slow compilation speed</a:t>
-            </a:r>
+              <a:t>Slow compilation and analysis speed</a:t>
+            </a:r>
+          </a:p>
+          <a:p>
+            <a:pPr lvl="2"/>
             <a:endParaRPr lang="zh-CN" altLang="en-US" dirty="0"/>
           </a:p>
         </p:txBody>
@@ -10798,7 +11097,7 @@
           <p:cNvPr id="2" name="Title 1">
             <a:extLst>
               <a:ext uri="{FF2B5EF4-FFF2-40B4-BE49-F238E27FC236}">
-                <a16:creationId xmlns:a16="http://schemas.microsoft.com/office/drawing/2014/main" id="{2078E4EA-2DBF-1582-BA91-E41A44308C07}"/>
+                <a16:creationId xmlns:a16="http://schemas.microsoft.com/office/drawing/2014/main" id="{D2681817-A947-5AF0-8297-FB2FCA13B326}"/>
               </a:ext>
             </a:extLst>
           </p:cNvPr>
@@ -10816,420 +11115,15 @@
           <a:p>
             <a:r>
               <a:rPr lang="en-US" altLang="zh-CN" dirty="0"/>
-              <a:t>Feature Summary</a:t>
-            </a:r>
-            <a:endParaRPr lang="zh-CN" altLang="en-US" dirty="0"/>
-          </a:p>
-        </p:txBody>
-      </p:sp>
-      <p:sp>
-        <p:nvSpPr>
-          <p:cNvPr id="3" name="Content Placeholder 2">
-            <a:extLst>
-              <a:ext uri="{FF2B5EF4-FFF2-40B4-BE49-F238E27FC236}">
-                <a16:creationId xmlns:a16="http://schemas.microsoft.com/office/drawing/2014/main" id="{2A591864-529A-C8B5-6DD5-A91378D2A3A2}"/>
-              </a:ext>
-            </a:extLst>
-          </p:cNvPr>
-          <p:cNvSpPr>
-            <a:spLocks noGrp="1"/>
-          </p:cNvSpPr>
-          <p:nvPr>
-            <p:ph idx="1"/>
-          </p:nvPr>
-        </p:nvSpPr>
-        <p:spPr>
-          <a:xfrm>
-            <a:off x="352425" y="1825625"/>
-            <a:ext cx="6067425" cy="4351338"/>
-          </a:xfrm>
-        </p:spPr>
-        <p:txBody>
-          <a:bodyPr>
-            <a:normAutofit fontScale="92500" lnSpcReduction="20000"/>
-          </a:bodyPr>
-          <a:lstStyle/>
-          <a:p>
-            <a:r>
-              <a:rPr lang="en-US" altLang="zh-CN" dirty="0"/>
-              <a:t>Primitive types: float, int, bool</a:t>
-            </a:r>
-          </a:p>
-          <a:p>
-            <a:pPr lvl="1"/>
-            <a:r>
-              <a:rPr lang="en-US" altLang="zh-CN" dirty="0"/>
-              <a:t>Can also be cast implicit from corresponding Scala type</a:t>
-            </a:r>
-          </a:p>
-          <a:p>
-            <a:r>
-              <a:rPr lang="en-US" altLang="zh-CN" dirty="0"/>
-              <a:t>Array type: 1D float array</a:t>
-            </a:r>
-          </a:p>
-          <a:p>
-            <a:r>
-              <a:rPr lang="en-US" altLang="zh-CN" dirty="0"/>
-              <a:t>Expression type: float, int, bool, and array</a:t>
-            </a:r>
-          </a:p>
-          <a:p>
-            <a:r>
-              <a:rPr lang="en-US" altLang="zh-CN" dirty="0"/>
-              <a:t>Operators</a:t>
-            </a:r>
-          </a:p>
-          <a:p>
-            <a:pPr lvl="1"/>
-            <a:r>
-              <a:rPr lang="en-US" altLang="zh-CN" dirty="0"/>
-              <a:t>Arithmetic: +, -, *, /, %, unary +, unary –</a:t>
-            </a:r>
-          </a:p>
-          <a:p>
-            <a:pPr lvl="1"/>
-            <a:r>
-              <a:rPr lang="en-US" altLang="zh-CN" dirty="0"/>
-              <a:t>Logical: ==, !=, &lt;, &lt;=, &gt;, &gt;=, &amp;&amp;, ||, !</a:t>
-            </a:r>
-          </a:p>
-          <a:p>
-            <a:r>
-              <a:rPr lang="en-US" altLang="zh-CN" dirty="0"/>
-              <a:t>Programming paradigms</a:t>
-            </a:r>
-          </a:p>
-          <a:p>
-            <a:pPr lvl="1"/>
-            <a:r>
-              <a:rPr lang="en-US" altLang="zh-CN" dirty="0"/>
-              <a:t>Functional programming</a:t>
-            </a:r>
-          </a:p>
-          <a:p>
-            <a:pPr lvl="2"/>
-            <a:r>
-              <a:rPr lang="en-US" altLang="zh-CN" dirty="0"/>
-              <a:t>map, zip with, reduce in block</a:t>
-            </a:r>
-          </a:p>
-          <a:p>
-            <a:pPr lvl="1"/>
-            <a:r>
-              <a:rPr lang="en-US" altLang="zh-CN" dirty="0"/>
-              <a:t>Array programming</a:t>
-            </a:r>
-          </a:p>
-          <a:p>
-            <a:pPr lvl="1"/>
-            <a:endParaRPr lang="en-US" altLang="zh-CN" dirty="0"/>
-          </a:p>
-        </p:txBody>
-      </p:sp>
-      <p:sp>
-        <p:nvSpPr>
-          <p:cNvPr id="4" name="Content Placeholder 2">
-            <a:extLst>
-              <a:ext uri="{FF2B5EF4-FFF2-40B4-BE49-F238E27FC236}">
-                <a16:creationId xmlns:a16="http://schemas.microsoft.com/office/drawing/2014/main" id="{D0E65256-C32F-34FA-9D76-1F9B9F243727}"/>
-              </a:ext>
-            </a:extLst>
-          </p:cNvPr>
-          <p:cNvSpPr txBox="1">
-            <a:spLocks/>
-          </p:cNvSpPr>
-          <p:nvPr/>
-        </p:nvSpPr>
-        <p:spPr>
-          <a:xfrm>
-            <a:off x="6200775" y="1825625"/>
-            <a:ext cx="6067425" cy="4351338"/>
-          </a:xfrm>
-          <a:prstGeom prst="rect">
-            <a:avLst/>
-          </a:prstGeom>
-        </p:spPr>
-        <p:txBody>
-          <a:bodyPr vert="horz" lIns="91440" tIns="45720" rIns="91440" bIns="45720" rtlCol="0">
-            <a:normAutofit/>
-          </a:bodyPr>
-          <a:lstStyle>
-            <a:lvl1pPr marL="228600" indent="-228600" algn="l" defTabSz="914400" rtl="0" eaLnBrk="1" latinLnBrk="0" hangingPunct="1">
-              <a:lnSpc>
-                <a:spcPct val="90000"/>
-              </a:lnSpc>
-              <a:spcBef>
-                <a:spcPts val="1000"/>
-              </a:spcBef>
-              <a:buFont typeface="Arial" panose="020B0604020202020204" pitchFamily="34" charset="0"/>
-              <a:buChar char="•"/>
-              <a:defRPr sz="2800" kern="1200">
-                <a:solidFill>
-                  <a:schemeClr val="tx1"/>
-                </a:solidFill>
-                <a:latin typeface="+mn-lt"/>
-                <a:ea typeface="+mn-ea"/>
-                <a:cs typeface="+mn-cs"/>
-              </a:defRPr>
-            </a:lvl1pPr>
-            <a:lvl2pPr marL="685800" indent="-228600" algn="l" defTabSz="914400" rtl="0" eaLnBrk="1" latinLnBrk="0" hangingPunct="1">
-              <a:lnSpc>
-                <a:spcPct val="90000"/>
-              </a:lnSpc>
-              <a:spcBef>
-                <a:spcPts val="500"/>
-              </a:spcBef>
-              <a:buFont typeface="Arial" panose="020B0604020202020204" pitchFamily="34" charset="0"/>
-              <a:buChar char="•"/>
-              <a:defRPr sz="2400" kern="1200">
-                <a:solidFill>
-                  <a:schemeClr val="tx1"/>
-                </a:solidFill>
-                <a:latin typeface="+mn-lt"/>
-                <a:ea typeface="+mn-ea"/>
-                <a:cs typeface="+mn-cs"/>
-              </a:defRPr>
-            </a:lvl2pPr>
-            <a:lvl3pPr marL="1143000" indent="-228600" algn="l" defTabSz="914400" rtl="0" eaLnBrk="1" latinLnBrk="0" hangingPunct="1">
-              <a:lnSpc>
-                <a:spcPct val="90000"/>
-              </a:lnSpc>
-              <a:spcBef>
-                <a:spcPts val="500"/>
-              </a:spcBef>
-              <a:buFont typeface="Arial" panose="020B0604020202020204" pitchFamily="34" charset="0"/>
-              <a:buChar char="•"/>
-              <a:defRPr sz="2000" kern="1200">
-                <a:solidFill>
-                  <a:schemeClr val="tx1"/>
-                </a:solidFill>
-                <a:latin typeface="+mn-lt"/>
-                <a:ea typeface="+mn-ea"/>
-                <a:cs typeface="+mn-cs"/>
-              </a:defRPr>
-            </a:lvl3pPr>
-            <a:lvl4pPr marL="1600200" indent="-228600" algn="l" defTabSz="914400" rtl="0" eaLnBrk="1" latinLnBrk="0" hangingPunct="1">
-              <a:lnSpc>
-                <a:spcPct val="90000"/>
-              </a:lnSpc>
-              <a:spcBef>
-                <a:spcPts val="500"/>
-              </a:spcBef>
-              <a:buFont typeface="Arial" panose="020B0604020202020204" pitchFamily="34" charset="0"/>
-              <a:buChar char="•"/>
-              <a:defRPr sz="1800" kern="1200">
-                <a:solidFill>
-                  <a:schemeClr val="tx1"/>
-                </a:solidFill>
-                <a:latin typeface="+mn-lt"/>
-                <a:ea typeface="+mn-ea"/>
-                <a:cs typeface="+mn-cs"/>
-              </a:defRPr>
-            </a:lvl4pPr>
-            <a:lvl5pPr marL="2057400" indent="-228600" algn="l" defTabSz="914400" rtl="0" eaLnBrk="1" latinLnBrk="0" hangingPunct="1">
-              <a:lnSpc>
-                <a:spcPct val="90000"/>
-              </a:lnSpc>
-              <a:spcBef>
-                <a:spcPts val="500"/>
-              </a:spcBef>
-              <a:buFont typeface="Arial" panose="020B0604020202020204" pitchFamily="34" charset="0"/>
-              <a:buChar char="•"/>
-              <a:defRPr sz="1800" kern="1200">
-                <a:solidFill>
-                  <a:schemeClr val="tx1"/>
-                </a:solidFill>
-                <a:latin typeface="+mn-lt"/>
-                <a:ea typeface="+mn-ea"/>
-                <a:cs typeface="+mn-cs"/>
-              </a:defRPr>
-            </a:lvl5pPr>
-            <a:lvl6pPr marL="2514600" indent="-228600" algn="l" defTabSz="914400" rtl="0" eaLnBrk="1" latinLnBrk="0" hangingPunct="1">
-              <a:lnSpc>
-                <a:spcPct val="90000"/>
-              </a:lnSpc>
-              <a:spcBef>
-                <a:spcPts val="500"/>
-              </a:spcBef>
-              <a:buFont typeface="Arial" panose="020B0604020202020204" pitchFamily="34" charset="0"/>
-              <a:buChar char="•"/>
-              <a:defRPr sz="1800" kern="1200">
-                <a:solidFill>
-                  <a:schemeClr val="tx1"/>
-                </a:solidFill>
-                <a:latin typeface="+mn-lt"/>
-                <a:ea typeface="+mn-ea"/>
-                <a:cs typeface="+mn-cs"/>
-              </a:defRPr>
-            </a:lvl6pPr>
-            <a:lvl7pPr marL="2971800" indent="-228600" algn="l" defTabSz="914400" rtl="0" eaLnBrk="1" latinLnBrk="0" hangingPunct="1">
-              <a:lnSpc>
-                <a:spcPct val="90000"/>
-              </a:lnSpc>
-              <a:spcBef>
-                <a:spcPts val="500"/>
-              </a:spcBef>
-              <a:buFont typeface="Arial" panose="020B0604020202020204" pitchFamily="34" charset="0"/>
-              <a:buChar char="•"/>
-              <a:defRPr sz="1800" kern="1200">
-                <a:solidFill>
-                  <a:schemeClr val="tx1"/>
-                </a:solidFill>
-                <a:latin typeface="+mn-lt"/>
-                <a:ea typeface="+mn-ea"/>
-                <a:cs typeface="+mn-cs"/>
-              </a:defRPr>
-            </a:lvl7pPr>
-            <a:lvl8pPr marL="3429000" indent="-228600" algn="l" defTabSz="914400" rtl="0" eaLnBrk="1" latinLnBrk="0" hangingPunct="1">
-              <a:lnSpc>
-                <a:spcPct val="90000"/>
-              </a:lnSpc>
-              <a:spcBef>
-                <a:spcPts val="500"/>
-              </a:spcBef>
-              <a:buFont typeface="Arial" panose="020B0604020202020204" pitchFamily="34" charset="0"/>
-              <a:buChar char="•"/>
-              <a:defRPr sz="1800" kern="1200">
-                <a:solidFill>
-                  <a:schemeClr val="tx1"/>
-                </a:solidFill>
-                <a:latin typeface="+mn-lt"/>
-                <a:ea typeface="+mn-ea"/>
-                <a:cs typeface="+mn-cs"/>
-              </a:defRPr>
-            </a:lvl8pPr>
-            <a:lvl9pPr marL="3886200" indent="-228600" algn="l" defTabSz="914400" rtl="0" eaLnBrk="1" latinLnBrk="0" hangingPunct="1">
-              <a:lnSpc>
-                <a:spcPct val="90000"/>
-              </a:lnSpc>
-              <a:spcBef>
-                <a:spcPts val="500"/>
-              </a:spcBef>
-              <a:buFont typeface="Arial" panose="020B0604020202020204" pitchFamily="34" charset="0"/>
-              <a:buChar char="•"/>
-              <a:defRPr sz="1800" kern="1200">
-                <a:solidFill>
-                  <a:schemeClr val="tx1"/>
-                </a:solidFill>
-                <a:latin typeface="+mn-lt"/>
-                <a:ea typeface="+mn-ea"/>
-                <a:cs typeface="+mn-cs"/>
-              </a:defRPr>
-            </a:lvl9pPr>
-          </a:lstStyle>
-          <a:p>
-            <a:r>
-              <a:rPr lang="en-US" altLang="zh-CN" dirty="0"/>
-              <a:t>Type system</a:t>
-            </a:r>
-          </a:p>
-          <a:p>
-            <a:pPr lvl="1"/>
-            <a:r>
-              <a:rPr lang="en-US" altLang="zh-CN" dirty="0"/>
-              <a:t>Struct type check at Scala compilation time</a:t>
-            </a:r>
-          </a:p>
-          <a:p>
-            <a:pPr lvl="1"/>
-            <a:r>
-              <a:rPr lang="en-US" altLang="zh-CN" dirty="0"/>
-              <a:t>Automatic type inference for return value</a:t>
-            </a:r>
-          </a:p>
-          <a:p>
-            <a:pPr lvl="1"/>
-            <a:r>
-              <a:rPr lang="en-US" altLang="zh-CN" dirty="0"/>
-              <a:t>Type safety for compiler development</a:t>
-            </a:r>
-          </a:p>
-          <a:p>
-            <a:r>
-              <a:rPr lang="en-US" altLang="zh-CN" dirty="0"/>
-              <a:t>Memory safety</a:t>
-            </a:r>
-          </a:p>
-          <a:p>
-            <a:pPr lvl="1"/>
-            <a:r>
-              <a:rPr lang="en-US" altLang="zh-CN" dirty="0"/>
-              <a:t>Bound check</a:t>
-            </a:r>
-          </a:p>
-          <a:p>
-            <a:r>
-              <a:rPr lang="en-US" altLang="zh-CN" dirty="0"/>
-              <a:t>Shared memory support</a:t>
-            </a:r>
-          </a:p>
-          <a:p>
-            <a:r>
-              <a:rPr lang="en-US" altLang="zh-CN" dirty="0"/>
-              <a:t>Support for indices</a:t>
-            </a:r>
-          </a:p>
-          <a:p>
-            <a:pPr lvl="1"/>
-            <a:endParaRPr lang="en-US" altLang="zh-CN" dirty="0"/>
-          </a:p>
-        </p:txBody>
-      </p:sp>
-    </p:spTree>
-    <p:extLst>
-      <p:ext uri="{BB962C8B-B14F-4D97-AF65-F5344CB8AC3E}">
-        <p14:creationId xmlns:p14="http://schemas.microsoft.com/office/powerpoint/2010/main" val="1810162794"/>
-      </p:ext>
-    </p:extLst>
-  </p:cSld>
-  <p:clrMapOvr>
-    <a:masterClrMapping/>
-  </p:clrMapOvr>
-</p:sld>
-</file>
-
-<file path=ppt/slides/slide6.xml><?xml version="1.0" encoding="utf-8"?>
-<p:sld xmlns:a="http://schemas.openxmlformats.org/drawingml/2006/main" xmlns:r="http://schemas.openxmlformats.org/officeDocument/2006/relationships" xmlns:p="http://schemas.openxmlformats.org/presentationml/2006/main">
-  <p:cSld>
-    <p:spTree>
-      <p:nvGrpSpPr>
-        <p:cNvPr id="1" name=""/>
-        <p:cNvGrpSpPr/>
-        <p:nvPr/>
-      </p:nvGrpSpPr>
-      <p:grpSpPr>
-        <a:xfrm>
-          <a:off x="0" y="0"/>
-          <a:ext cx="0" cy="0"/>
-          <a:chOff x="0" y="0"/>
-          <a:chExt cx="0" cy="0"/>
-        </a:xfrm>
-      </p:grpSpPr>
-      <p:sp>
-        <p:nvSpPr>
-          <p:cNvPr id="2" name="Title 1">
-            <a:extLst>
-              <a:ext uri="{FF2B5EF4-FFF2-40B4-BE49-F238E27FC236}">
-                <a16:creationId xmlns:a16="http://schemas.microsoft.com/office/drawing/2014/main" id="{D2681817-A947-5AF0-8297-FB2FCA13B326}"/>
-              </a:ext>
-            </a:extLst>
-          </p:cNvPr>
-          <p:cNvSpPr>
-            <a:spLocks noGrp="1"/>
-          </p:cNvSpPr>
-          <p:nvPr>
-            <p:ph type="title"/>
-          </p:nvPr>
-        </p:nvSpPr>
-        <p:spPr/>
-        <p:txBody>
-          <a:bodyPr/>
-          <a:lstStyle/>
-          <a:p>
-            <a:r>
-              <a:rPr lang="en-US" altLang="zh-CN" dirty="0"/>
-              <a:t>Examples</a:t>
+              <a:t>Examples (</a:t>
+            </a:r>
+            <a:r>
+              <a:rPr lang="en-US" altLang="zh-CN" dirty="0" err="1"/>
+              <a:t>saxpy</a:t>
+            </a:r>
+            <a:r>
+              <a:rPr lang="en-US" altLang="zh-CN" dirty="0"/>
+              <a:t>)</a:t>
             </a:r>
             <a:endParaRPr lang="zh-CN" altLang="en-US" dirty="0"/>
           </a:p>
@@ -11303,7 +11197,7 @@
 </p:sld>
 </file>
 
-<file path=ppt/slides/slide7.xml><?xml version="1.0" encoding="utf-8"?>
+<file path=ppt/slides/slide6.xml><?xml version="1.0" encoding="utf-8"?>
 <p:sld xmlns:a="http://schemas.openxmlformats.org/drawingml/2006/main" xmlns:r="http://schemas.openxmlformats.org/officeDocument/2006/relationships" xmlns:p="http://schemas.openxmlformats.org/presentationml/2006/main">
   <p:cSld>
     <p:spTree>
@@ -11343,7 +11237,15 @@
           <a:p>
             <a:r>
               <a:rPr lang="en-US" altLang="zh-CN" dirty="0"/>
-              <a:t>Examples</a:t>
+              <a:t>Examples (</a:t>
+            </a:r>
+            <a:r>
+              <a:rPr lang="en-US" altLang="zh-CN" dirty="0" err="1"/>
+              <a:t>saxpy</a:t>
+            </a:r>
+            <a:r>
+              <a:rPr lang="en-US" altLang="zh-CN" dirty="0"/>
+              <a:t>)</a:t>
             </a:r>
             <a:endParaRPr lang="zh-CN" altLang="en-US" dirty="0"/>
           </a:p>
@@ -11447,7 +11349,7 @@
 </p:sld>
 </file>
 
-<file path=ppt/slides/slide8.xml><?xml version="1.0" encoding="utf-8"?>
+<file path=ppt/slides/slide7.xml><?xml version="1.0" encoding="utf-8"?>
 <p:sld xmlns:a="http://schemas.openxmlformats.org/drawingml/2006/main" xmlns:r="http://schemas.openxmlformats.org/officeDocument/2006/relationships" xmlns:p="http://schemas.openxmlformats.org/presentationml/2006/main">
   <p:cSld>
     <p:spTree>
@@ -11487,7 +11389,7 @@
           <a:p>
             <a:r>
               <a:rPr lang="en-US" altLang="zh-CN" dirty="0"/>
-              <a:t>Examples</a:t>
+              <a:t>Examples (blur, map with index)</a:t>
             </a:r>
             <a:endParaRPr lang="zh-CN" altLang="en-US" dirty="0"/>
           </a:p>
@@ -11561,6 +11463,150 @@
 </p:sld>
 </file>
 
+<file path=ppt/slides/slide8.xml><?xml version="1.0" encoding="utf-8"?>
+<p:sld xmlns:a="http://schemas.openxmlformats.org/drawingml/2006/main" xmlns:r="http://schemas.openxmlformats.org/officeDocument/2006/relationships" xmlns:p="http://schemas.openxmlformats.org/presentationml/2006/main">
+  <p:cSld>
+    <p:spTree>
+      <p:nvGrpSpPr>
+        <p:cNvPr id="1" name=""/>
+        <p:cNvGrpSpPr/>
+        <p:nvPr/>
+      </p:nvGrpSpPr>
+      <p:grpSpPr>
+        <a:xfrm>
+          <a:off x="0" y="0"/>
+          <a:ext cx="0" cy="0"/>
+          <a:chOff x="0" y="0"/>
+          <a:chExt cx="0" cy="0"/>
+        </a:xfrm>
+      </p:grpSpPr>
+      <p:sp>
+        <p:nvSpPr>
+          <p:cNvPr id="2" name="Title 1">
+            <a:extLst>
+              <a:ext uri="{FF2B5EF4-FFF2-40B4-BE49-F238E27FC236}">
+                <a16:creationId xmlns:a16="http://schemas.microsoft.com/office/drawing/2014/main" id="{E0EF6AE0-4233-CDCD-ACB3-6B29ECCD4E9A}"/>
+              </a:ext>
+            </a:extLst>
+          </p:cNvPr>
+          <p:cNvSpPr>
+            <a:spLocks noGrp="1"/>
+          </p:cNvSpPr>
+          <p:nvPr>
+            <p:ph type="title"/>
+          </p:nvPr>
+        </p:nvSpPr>
+        <p:spPr/>
+        <p:txBody>
+          <a:bodyPr/>
+          <a:lstStyle/>
+          <a:p>
+            <a:r>
+              <a:rPr lang="en-US" altLang="zh-CN" dirty="0"/>
+              <a:t>Examples (blur, map with index)</a:t>
+            </a:r>
+            <a:endParaRPr lang="zh-CN" altLang="en-US" dirty="0"/>
+          </a:p>
+        </p:txBody>
+      </p:sp>
+      <p:sp>
+        <p:nvSpPr>
+          <p:cNvPr id="3" name="Content Placeholder 2">
+            <a:extLst>
+              <a:ext uri="{FF2B5EF4-FFF2-40B4-BE49-F238E27FC236}">
+                <a16:creationId xmlns:a16="http://schemas.microsoft.com/office/drawing/2014/main" id="{02EBFDE3-8A44-5BE6-9E7F-4B5C537F844E}"/>
+              </a:ext>
+            </a:extLst>
+          </p:cNvPr>
+          <p:cNvSpPr>
+            <a:spLocks noGrp="1"/>
+          </p:cNvSpPr>
+          <p:nvPr>
+            <p:ph idx="1"/>
+          </p:nvPr>
+        </p:nvSpPr>
+        <p:spPr/>
+        <p:txBody>
+          <a:bodyPr/>
+          <a:lstStyle/>
+          <a:p>
+            <a:endParaRPr lang="zh-CN" altLang="en-US"/>
+          </a:p>
+        </p:txBody>
+      </p:sp>
+      <p:pic>
+        <p:nvPicPr>
+          <p:cNvPr id="5" name="Picture 4">
+            <a:extLst>
+              <a:ext uri="{FF2B5EF4-FFF2-40B4-BE49-F238E27FC236}">
+                <a16:creationId xmlns:a16="http://schemas.microsoft.com/office/drawing/2014/main" id="{134A1398-B7E6-43E7-28AF-BBD120AE657A}"/>
+              </a:ext>
+            </a:extLst>
+          </p:cNvPr>
+          <p:cNvPicPr>
+            <a:picLocks noChangeAspect="1"/>
+          </p:cNvPicPr>
+          <p:nvPr/>
+        </p:nvPicPr>
+        <p:blipFill>
+          <a:blip r:embed="rId2"/>
+          <a:stretch>
+            <a:fillRect/>
+          </a:stretch>
+        </p:blipFill>
+        <p:spPr>
+          <a:xfrm>
+            <a:off x="838200" y="1690688"/>
+            <a:ext cx="5962956" cy="5016758"/>
+          </a:xfrm>
+          <a:prstGeom prst="rect">
+            <a:avLst/>
+          </a:prstGeom>
+        </p:spPr>
+      </p:pic>
+      <p:pic>
+        <p:nvPicPr>
+          <p:cNvPr id="7" name="Picture 6">
+            <a:extLst>
+              <a:ext uri="{FF2B5EF4-FFF2-40B4-BE49-F238E27FC236}">
+                <a16:creationId xmlns:a16="http://schemas.microsoft.com/office/drawing/2014/main" id="{A4F066B9-9558-27BE-2485-531361E14C43}"/>
+              </a:ext>
+            </a:extLst>
+          </p:cNvPr>
+          <p:cNvPicPr>
+            <a:picLocks noChangeAspect="1"/>
+          </p:cNvPicPr>
+          <p:nvPr/>
+        </p:nvPicPr>
+        <p:blipFill>
+          <a:blip r:embed="rId3"/>
+          <a:stretch>
+            <a:fillRect/>
+          </a:stretch>
+        </p:blipFill>
+        <p:spPr>
+          <a:xfrm>
+            <a:off x="7200149" y="1690688"/>
+            <a:ext cx="4521432" cy="3302170"/>
+          </a:xfrm>
+          <a:prstGeom prst="rect">
+            <a:avLst/>
+          </a:prstGeom>
+        </p:spPr>
+      </p:pic>
+    </p:spTree>
+    <p:extLst>
+      <p:ext uri="{BB962C8B-B14F-4D97-AF65-F5344CB8AC3E}">
+        <p14:creationId xmlns:p14="http://schemas.microsoft.com/office/powerpoint/2010/main" val="173291367"/>
+      </p:ext>
+    </p:extLst>
+  </p:cSld>
+  <p:clrMapOvr>
+    <a:masterClrMapping/>
+  </p:clrMapOvr>
+</p:sld>
+</file>
+
 <file path=ppt/slides/slide9.xml><?xml version="1.0" encoding="utf-8"?>
 <p:sld xmlns:a="http://schemas.openxmlformats.org/drawingml/2006/main" xmlns:r="http://schemas.openxmlformats.org/officeDocument/2006/relationships" xmlns:p="http://schemas.openxmlformats.org/presentationml/2006/main">
   <p:cSld>
@@ -11583,7 +11629,7 @@
           <p:cNvPr id="2" name="Title 1">
             <a:extLst>
               <a:ext uri="{FF2B5EF4-FFF2-40B4-BE49-F238E27FC236}">
-                <a16:creationId xmlns:a16="http://schemas.microsoft.com/office/drawing/2014/main" id="{E0EF6AE0-4233-CDCD-ACB3-6B29ECCD4E9A}"/>
+                <a16:creationId xmlns:a16="http://schemas.microsoft.com/office/drawing/2014/main" id="{76EA041E-D6C6-2625-CC45-FDE60D80B41A}"/>
               </a:ext>
             </a:extLst>
           </p:cNvPr>
@@ -11601,7 +11647,7 @@
           <a:p>
             <a:r>
               <a:rPr lang="en-US" altLang="zh-CN" dirty="0"/>
-              <a:t>Examples</a:t>
+              <a:t>Examples (reduce in block)</a:t>
             </a:r>
             <a:endParaRPr lang="zh-CN" altLang="en-US" dirty="0"/>
           </a:p>
@@ -11612,7 +11658,7 @@
           <p:cNvPr id="3" name="Content Placeholder 2">
             <a:extLst>
               <a:ext uri="{FF2B5EF4-FFF2-40B4-BE49-F238E27FC236}">
-                <a16:creationId xmlns:a16="http://schemas.microsoft.com/office/drawing/2014/main" id="{02EBFDE3-8A44-5BE6-9E7F-4B5C537F844E}"/>
+                <a16:creationId xmlns:a16="http://schemas.microsoft.com/office/drawing/2014/main" id="{630A0D16-E875-341F-2DAC-8FF3CE64420C}"/>
               </a:ext>
             </a:extLst>
           </p:cNvPr>
@@ -11634,10 +11680,10 @@
       </p:sp>
       <p:pic>
         <p:nvPicPr>
-          <p:cNvPr id="14" name="Picture 13">
-            <a:extLst>
-              <a:ext uri="{FF2B5EF4-FFF2-40B4-BE49-F238E27FC236}">
-                <a16:creationId xmlns:a16="http://schemas.microsoft.com/office/drawing/2014/main" id="{D0B75EA1-EF7D-97BE-49CC-FFE1EF6F63E1}"/>
+          <p:cNvPr id="5" name="Picture 4">
+            <a:extLst>
+              <a:ext uri="{FF2B5EF4-FFF2-40B4-BE49-F238E27FC236}">
+                <a16:creationId xmlns:a16="http://schemas.microsoft.com/office/drawing/2014/main" id="{785E48CA-77AB-9444-3847-FDF9F0E27D30}"/>
               </a:ext>
             </a:extLst>
           </p:cNvPr>
@@ -11654,8 +11700,8 @@
         </p:blipFill>
         <p:spPr>
           <a:xfrm>
-            <a:off x="401158" y="1568768"/>
-            <a:ext cx="6312224" cy="5092962"/>
+            <a:off x="838200" y="1825625"/>
+            <a:ext cx="5980445" cy="1530428"/>
           </a:xfrm>
           <a:prstGeom prst="rect">
             <a:avLst/>
@@ -11664,10 +11710,10 @@
       </p:pic>
       <p:pic>
         <p:nvPicPr>
-          <p:cNvPr id="16" name="Picture 15">
-            <a:extLst>
-              <a:ext uri="{FF2B5EF4-FFF2-40B4-BE49-F238E27FC236}">
-                <a16:creationId xmlns:a16="http://schemas.microsoft.com/office/drawing/2014/main" id="{9FA3E4DE-E670-6682-6276-59001CDC8F7B}"/>
+          <p:cNvPr id="7" name="Picture 6">
+            <a:extLst>
+              <a:ext uri="{FF2B5EF4-FFF2-40B4-BE49-F238E27FC236}">
+                <a16:creationId xmlns:a16="http://schemas.microsoft.com/office/drawing/2014/main" id="{4A27198B-0A7B-9E52-96C9-255E1D047683}"/>
               </a:ext>
             </a:extLst>
           </p:cNvPr>
@@ -11684,8 +11730,8 @@
         </p:blipFill>
         <p:spPr>
           <a:xfrm>
-            <a:off x="6966560" y="1568768"/>
-            <a:ext cx="4134062" cy="3359323"/>
+            <a:off x="838200" y="3934580"/>
+            <a:ext cx="5800078" cy="2435225"/>
           </a:xfrm>
           <a:prstGeom prst="rect">
             <a:avLst/>
@@ -11695,7 +11741,7 @@
     </p:spTree>
     <p:extLst>
       <p:ext uri="{BB962C8B-B14F-4D97-AF65-F5344CB8AC3E}">
-        <p14:creationId xmlns:p14="http://schemas.microsoft.com/office/powerpoint/2010/main" val="173291367"/>
+        <p14:creationId xmlns:p14="http://schemas.microsoft.com/office/powerpoint/2010/main" val="1431643269"/>
       </p:ext>
     </p:extLst>
   </p:cSld>

</xml_diff>